<commit_message>
Modified documents with new system architecture to exclude radio and include SD card. Inclued Schedule Protocol in the processor implementation. Included data type for UAV device. Added properties to thread receive radio.
</commit_message>
<xml_diff>
--- a/docs/ARP_CAM_System.pptx
+++ b/docs/ARP_CAM_System.pptx
@@ -6,6 +6,7 @@
   </p:sldMasterIdLst>
   <p:sldIdLst>
     <p:sldId id="256" r:id="rId2"/>
+    <p:sldId id="257" r:id="rId3"/>
   </p:sldIdLst>
   <p:sldSz cx="12192000" cy="6858000"/>
   <p:notesSz cx="6858000" cy="9144000"/>
@@ -267,7 +268,7 @@
           <a:p>
             <a:fld id="{2B5A14DD-52E5-4A07-9C50-A1D7FE039FE9}" type="datetimeFigureOut">
               <a:rPr lang="en-US" smtClean="0"/>
-              <a:t>9/26/2019</a:t>
+              <a:t>9/27/2019</a:t>
             </a:fld>
             <a:endParaRPr lang="en-US"/>
           </a:p>
@@ -465,7 +466,7 @@
           <a:p>
             <a:fld id="{2B5A14DD-52E5-4A07-9C50-A1D7FE039FE9}" type="datetimeFigureOut">
               <a:rPr lang="en-US" smtClean="0"/>
-              <a:t>9/26/2019</a:t>
+              <a:t>9/27/2019</a:t>
             </a:fld>
             <a:endParaRPr lang="en-US"/>
           </a:p>
@@ -673,7 +674,7 @@
           <a:p>
             <a:fld id="{2B5A14DD-52E5-4A07-9C50-A1D7FE039FE9}" type="datetimeFigureOut">
               <a:rPr lang="en-US" smtClean="0"/>
-              <a:t>9/26/2019</a:t>
+              <a:t>9/27/2019</a:t>
             </a:fld>
             <a:endParaRPr lang="en-US"/>
           </a:p>
@@ -871,7 +872,7 @@
           <a:p>
             <a:fld id="{2B5A14DD-52E5-4A07-9C50-A1D7FE039FE9}" type="datetimeFigureOut">
               <a:rPr lang="en-US" smtClean="0"/>
-              <a:t>9/26/2019</a:t>
+              <a:t>9/27/2019</a:t>
             </a:fld>
             <a:endParaRPr lang="en-US"/>
           </a:p>
@@ -1146,7 +1147,7 @@
           <a:p>
             <a:fld id="{2B5A14DD-52E5-4A07-9C50-A1D7FE039FE9}" type="datetimeFigureOut">
               <a:rPr lang="en-US" smtClean="0"/>
-              <a:t>9/26/2019</a:t>
+              <a:t>9/27/2019</a:t>
             </a:fld>
             <a:endParaRPr lang="en-US"/>
           </a:p>
@@ -1411,7 +1412,7 @@
           <a:p>
             <a:fld id="{2B5A14DD-52E5-4A07-9C50-A1D7FE039FE9}" type="datetimeFigureOut">
               <a:rPr lang="en-US" smtClean="0"/>
-              <a:t>9/26/2019</a:t>
+              <a:t>9/27/2019</a:t>
             </a:fld>
             <a:endParaRPr lang="en-US"/>
           </a:p>
@@ -1823,7 +1824,7 @@
           <a:p>
             <a:fld id="{2B5A14DD-52E5-4A07-9C50-A1D7FE039FE9}" type="datetimeFigureOut">
               <a:rPr lang="en-US" smtClean="0"/>
-              <a:t>9/26/2019</a:t>
+              <a:t>9/27/2019</a:t>
             </a:fld>
             <a:endParaRPr lang="en-US"/>
           </a:p>
@@ -1964,7 +1965,7 @@
           <a:p>
             <a:fld id="{2B5A14DD-52E5-4A07-9C50-A1D7FE039FE9}" type="datetimeFigureOut">
               <a:rPr lang="en-US" smtClean="0"/>
-              <a:t>9/26/2019</a:t>
+              <a:t>9/27/2019</a:t>
             </a:fld>
             <a:endParaRPr lang="en-US"/>
           </a:p>
@@ -2077,7 +2078,7 @@
           <a:p>
             <a:fld id="{2B5A14DD-52E5-4A07-9C50-A1D7FE039FE9}" type="datetimeFigureOut">
               <a:rPr lang="en-US" smtClean="0"/>
-              <a:t>9/26/2019</a:t>
+              <a:t>9/27/2019</a:t>
             </a:fld>
             <a:endParaRPr lang="en-US"/>
           </a:p>
@@ -2388,7 +2389,7 @@
           <a:p>
             <a:fld id="{2B5A14DD-52E5-4A07-9C50-A1D7FE039FE9}" type="datetimeFigureOut">
               <a:rPr lang="en-US" smtClean="0"/>
-              <a:t>9/26/2019</a:t>
+              <a:t>9/27/2019</a:t>
             </a:fld>
             <a:endParaRPr lang="en-US"/>
           </a:p>
@@ -2676,7 +2677,7 @@
           <a:p>
             <a:fld id="{2B5A14DD-52E5-4A07-9C50-A1D7FE039FE9}" type="datetimeFigureOut">
               <a:rPr lang="en-US" smtClean="0"/>
-              <a:t>9/26/2019</a:t>
+              <a:t>9/27/2019</a:t>
             </a:fld>
             <a:endParaRPr lang="en-US"/>
           </a:p>
@@ -2917,7 +2918,7 @@
           <a:p>
             <a:fld id="{2B5A14DD-52E5-4A07-9C50-A1D7FE039FE9}" type="datetimeFigureOut">
               <a:rPr lang="en-US" smtClean="0"/>
-              <a:t>9/26/2019</a:t>
+              <a:t>9/27/2019</a:t>
             </a:fld>
             <a:endParaRPr lang="en-US"/>
           </a:p>
@@ -3981,8 +3982,8 @@
         </p:nvSpPr>
         <p:spPr>
           <a:xfrm>
-            <a:off x="3874912" y="1105833"/>
-            <a:ext cx="948267" cy="475488"/>
+            <a:off x="4047335" y="1349444"/>
+            <a:ext cx="914400" cy="228600"/>
           </a:xfrm>
           <a:prstGeom prst="rect">
             <a:avLst/>
@@ -3995,7 +3996,7 @@
           </a:ln>
         </p:spPr>
         <p:txBody>
-          <a:bodyPr wrap="square" rtlCol="0">
+          <a:bodyPr wrap="square" rtlCol="0" anchor="ctr">
             <a:noAutofit/>
           </a:bodyPr>
           <a:lstStyle/>
@@ -4022,8 +4023,8 @@
         </p:nvSpPr>
         <p:spPr>
           <a:xfrm>
-            <a:off x="6397946" y="1105833"/>
-            <a:ext cx="948267" cy="475488"/>
+            <a:off x="6243875" y="1360397"/>
+            <a:ext cx="914400" cy="228600"/>
           </a:xfrm>
           <a:prstGeom prst="rect">
             <a:avLst/>
@@ -4036,7 +4037,7 @@
           </a:ln>
         </p:spPr>
         <p:txBody>
-          <a:bodyPr wrap="square" rtlCol="0">
+          <a:bodyPr wrap="square" rtlCol="0" anchor="ctr">
             <a:noAutofit/>
           </a:bodyPr>
           <a:lstStyle/>
@@ -4045,95 +4046,6 @@
             <a:r>
               <a:rPr lang="pt-BR" sz="1100" dirty="0"/>
               <a:t>Câmera</a:t>
-            </a:r>
-          </a:p>
-        </p:txBody>
-      </p:sp>
-      <p:sp>
-        <p:nvSpPr>
-          <p:cNvPr id="27" name="TextBox 26">
-            <a:extLst>
-              <a:ext uri="{FF2B5EF4-FFF2-40B4-BE49-F238E27FC236}">
-                <a16:creationId xmlns:a16="http://schemas.microsoft.com/office/drawing/2014/main" id="{A7AA7DA4-3366-4BF0-A060-A35D403EF61F}"/>
-              </a:ext>
-            </a:extLst>
-          </p:cNvPr>
-          <p:cNvSpPr txBox="1"/>
-          <p:nvPr/>
-        </p:nvSpPr>
-        <p:spPr>
-          <a:xfrm>
-            <a:off x="4645377" y="2304304"/>
-            <a:ext cx="1936045" cy="1369256"/>
-          </a:xfrm>
-          <a:prstGeom prst="rect">
-            <a:avLst/>
-          </a:prstGeom>
-          <a:noFill/>
-          <a:ln>
-            <a:solidFill>
-              <a:schemeClr val="tx1"/>
-            </a:solidFill>
-          </a:ln>
-        </p:spPr>
-        <p:txBody>
-          <a:bodyPr wrap="square" rtlCol="0">
-            <a:noAutofit/>
-          </a:bodyPr>
-          <a:lstStyle/>
-          <a:p>
-            <a:pPr algn="ctr"/>
-            <a:r>
-              <a:rPr lang="pt-BR" sz="1100" dirty="0"/>
-              <a:t>Plataforma</a:t>
-            </a:r>
-          </a:p>
-        </p:txBody>
-      </p:sp>
-      <p:sp>
-        <p:nvSpPr>
-          <p:cNvPr id="29" name="TextBox 28">
-            <a:extLst>
-              <a:ext uri="{FF2B5EF4-FFF2-40B4-BE49-F238E27FC236}">
-                <a16:creationId xmlns:a16="http://schemas.microsoft.com/office/drawing/2014/main" id="{52B3C39E-E14E-449A-8C90-1EDB5556A549}"/>
-              </a:ext>
-            </a:extLst>
-          </p:cNvPr>
-          <p:cNvSpPr txBox="1"/>
-          <p:nvPr/>
-        </p:nvSpPr>
-        <p:spPr>
-          <a:xfrm>
-            <a:off x="7419615" y="2304304"/>
-            <a:ext cx="1936045" cy="1369256"/>
-          </a:xfrm>
-          <a:prstGeom prst="rect">
-            <a:avLst/>
-          </a:prstGeom>
-          <a:noFill/>
-          <a:ln>
-            <a:solidFill>
-              <a:schemeClr val="tx1"/>
-            </a:solidFill>
-          </a:ln>
-        </p:spPr>
-        <p:txBody>
-          <a:bodyPr wrap="square" rtlCol="0">
-            <a:noAutofit/>
-          </a:bodyPr>
-          <a:lstStyle/>
-          <a:p>
-            <a:pPr algn="ctr"/>
-            <a:r>
-              <a:rPr lang="pt-BR" sz="1100" dirty="0"/>
-              <a:t>Controlador</a:t>
-            </a:r>
-          </a:p>
-          <a:p>
-            <a:pPr algn="ctr"/>
-            <a:r>
-              <a:rPr lang="pt-BR" sz="1100" dirty="0"/>
-              <a:t>ARP</a:t>
             </a:r>
           </a:p>
         </p:txBody>
@@ -4148,8 +4060,8 @@
             </a:extLst>
           </p:cNvPr>
           <p:cNvCxnSpPr>
+            <a:cxnSpLocks/>
             <a:stCxn id="14" idx="3"/>
-            <a:endCxn id="27" idx="1"/>
           </p:cNvCxnSpPr>
           <p:nvPr/>
         </p:nvCxnSpPr>
@@ -4192,8 +4104,8 @@
             </a:extLst>
           </p:cNvPr>
           <p:cNvCxnSpPr>
+            <a:cxnSpLocks/>
             <a:stCxn id="7" idx="3"/>
-            <a:endCxn id="27" idx="1"/>
           </p:cNvCxnSpPr>
           <p:nvPr/>
         </p:nvCxnSpPr>
@@ -4236,8 +4148,8 @@
             </a:extLst>
           </p:cNvPr>
           <p:cNvCxnSpPr>
+            <a:cxnSpLocks/>
             <a:stCxn id="18" idx="3"/>
-            <a:endCxn id="27" idx="1"/>
           </p:cNvCxnSpPr>
           <p:nvPr/>
         </p:nvCxnSpPr>
@@ -4280,15 +4192,16 @@
             </a:extLst>
           </p:cNvPr>
           <p:cNvCxnSpPr>
-            <a:stCxn id="27" idx="3"/>
+            <a:cxnSpLocks/>
+            <a:stCxn id="49" idx="2"/>
             <a:endCxn id="29" idx="1"/>
           </p:cNvCxnSpPr>
           <p:nvPr/>
         </p:nvCxnSpPr>
         <p:spPr>
-          <a:xfrm>
-            <a:off x="6581422" y="2988932"/>
-            <a:ext cx="838193" cy="0"/>
+          <a:xfrm flipV="1">
+            <a:off x="6577610" y="2977842"/>
+            <a:ext cx="1010210" cy="10128"/>
           </a:xfrm>
           <a:prstGeom prst="line">
             <a:avLst/>
@@ -4316,65 +4229,21 @@
       </p:cxnSp>
       <p:cxnSp>
         <p:nvCxnSpPr>
-          <p:cNvPr id="50" name="Connector: Elbow 49">
-            <a:extLst>
-              <a:ext uri="{FF2B5EF4-FFF2-40B4-BE49-F238E27FC236}">
-                <a16:creationId xmlns:a16="http://schemas.microsoft.com/office/drawing/2014/main" id="{78094ED6-8668-40E1-A524-70DB934C6AF2}"/>
+          <p:cNvPr id="56" name="Connector: Elbow 55">
+            <a:extLst>
+              <a:ext uri="{FF2B5EF4-FFF2-40B4-BE49-F238E27FC236}">
+                <a16:creationId xmlns:a16="http://schemas.microsoft.com/office/drawing/2014/main" id="{E356A1E1-E16B-4F1B-91C1-6CE9E0D46D9F}"/>
               </a:ext>
             </a:extLst>
           </p:cNvPr>
           <p:cNvCxnSpPr>
             <a:cxnSpLocks/>
-            <a:stCxn id="25" idx="2"/>
-          </p:cNvCxnSpPr>
-          <p:nvPr/>
-        </p:nvCxnSpPr>
-        <p:spPr>
-          <a:xfrm rot="16200000" flipH="1">
-            <a:off x="4312110" y="1618257"/>
-            <a:ext cx="722983" cy="649110"/>
-          </a:xfrm>
-          <a:prstGeom prst="bentConnector3">
-            <a:avLst/>
-          </a:prstGeom>
-          <a:ln w="19050">
-            <a:solidFill>
-              <a:schemeClr val="tx1"/>
-            </a:solidFill>
-          </a:ln>
-        </p:spPr>
-        <p:style>
-          <a:lnRef idx="1">
-            <a:schemeClr val="accent1"/>
-          </a:lnRef>
-          <a:fillRef idx="0">
-            <a:schemeClr val="accent1"/>
-          </a:fillRef>
-          <a:effectRef idx="0">
-            <a:schemeClr val="accent1"/>
-          </a:effectRef>
-          <a:fontRef idx="minor">
-            <a:schemeClr val="tx1"/>
-          </a:fontRef>
-        </p:style>
-      </p:cxnSp>
-      <p:cxnSp>
-        <p:nvCxnSpPr>
-          <p:cNvPr id="56" name="Connector: Elbow 55">
-            <a:extLst>
-              <a:ext uri="{FF2B5EF4-FFF2-40B4-BE49-F238E27FC236}">
-                <a16:creationId xmlns:a16="http://schemas.microsoft.com/office/drawing/2014/main" id="{E356A1E1-E16B-4F1B-91C1-6CE9E0D46D9F}"/>
-              </a:ext>
-            </a:extLst>
-          </p:cNvPr>
-          <p:cNvCxnSpPr>
-            <a:stCxn id="26" idx="2"/>
           </p:cNvCxnSpPr>
           <p:nvPr/>
         </p:nvCxnSpPr>
         <p:spPr>
           <a:xfrm rot="5400000">
-            <a:off x="6201558" y="1628137"/>
+            <a:off x="6036482" y="1643942"/>
             <a:ext cx="717338" cy="623707"/>
           </a:xfrm>
           <a:prstGeom prst="bentConnector3">
@@ -4401,12 +4270,116 @@
           </a:fontRef>
         </p:style>
       </p:cxnSp>
-      <p:sp>
-        <p:nvSpPr>
-          <p:cNvPr id="28" name="TextBox 27">
-            <a:extLst>
-              <a:ext uri="{FF2B5EF4-FFF2-40B4-BE49-F238E27FC236}">
-                <a16:creationId xmlns:a16="http://schemas.microsoft.com/office/drawing/2014/main" id="{D04DA8AE-F15B-4BF0-A8A8-6EAFFC21A55C}"/>
+      <p:grpSp>
+        <p:nvGrpSpPr>
+          <p:cNvPr id="76" name="Group 75">
+            <a:extLst>
+              <a:ext uri="{FF2B5EF4-FFF2-40B4-BE49-F238E27FC236}">
+                <a16:creationId xmlns:a16="http://schemas.microsoft.com/office/drawing/2014/main" id="{40BC70D7-74D8-4508-B132-521C8F2FF221}"/>
+              </a:ext>
+            </a:extLst>
+          </p:cNvPr>
+          <p:cNvGrpSpPr/>
+          <p:nvPr/>
+        </p:nvGrpSpPr>
+        <p:grpSpPr>
+          <a:xfrm>
+            <a:off x="7587820" y="2293214"/>
+            <a:ext cx="1936045" cy="1369256"/>
+            <a:chOff x="8187260" y="2293214"/>
+            <a:chExt cx="1936045" cy="1369256"/>
+          </a:xfrm>
+        </p:grpSpPr>
+        <p:sp>
+          <p:nvSpPr>
+            <p:cNvPr id="29" name="TextBox 28">
+              <a:extLst>
+                <a:ext uri="{FF2B5EF4-FFF2-40B4-BE49-F238E27FC236}">
+                  <a16:creationId xmlns:a16="http://schemas.microsoft.com/office/drawing/2014/main" id="{52B3C39E-E14E-449A-8C90-1EDB5556A549}"/>
+                </a:ext>
+              </a:extLst>
+            </p:cNvPr>
+            <p:cNvSpPr txBox="1"/>
+            <p:nvPr/>
+          </p:nvSpPr>
+          <p:spPr>
+            <a:xfrm>
+              <a:off x="8187260" y="2293214"/>
+              <a:ext cx="1936045" cy="1369256"/>
+            </a:xfrm>
+            <a:prstGeom prst="rect">
+              <a:avLst/>
+            </a:prstGeom>
+            <a:noFill/>
+            <a:ln>
+              <a:solidFill>
+                <a:schemeClr val="tx1"/>
+              </a:solidFill>
+              <a:prstDash val="dash"/>
+            </a:ln>
+          </p:spPr>
+          <p:txBody>
+            <a:bodyPr wrap="square" rtlCol="0">
+              <a:noAutofit/>
+            </a:bodyPr>
+            <a:lstStyle/>
+            <a:p>
+              <a:pPr algn="ctr"/>
+              <a:r>
+                <a:rPr lang="pt-BR" dirty="0"/>
+                <a:t>UAV</a:t>
+              </a:r>
+            </a:p>
+          </p:txBody>
+        </p:sp>
+        <p:sp>
+          <p:nvSpPr>
+            <p:cNvPr id="28" name="TextBox 27">
+              <a:extLst>
+                <a:ext uri="{FF2B5EF4-FFF2-40B4-BE49-F238E27FC236}">
+                  <a16:creationId xmlns:a16="http://schemas.microsoft.com/office/drawing/2014/main" id="{D04DA8AE-F15B-4BF0-A8A8-6EAFFC21A55C}"/>
+                </a:ext>
+              </a:extLst>
+            </p:cNvPr>
+            <p:cNvSpPr txBox="1"/>
+            <p:nvPr/>
+          </p:nvSpPr>
+          <p:spPr>
+            <a:xfrm>
+              <a:off x="9155282" y="3314700"/>
+              <a:ext cx="914400" cy="228600"/>
+            </a:xfrm>
+            <a:prstGeom prst="rect">
+              <a:avLst/>
+            </a:prstGeom>
+            <a:noFill/>
+            <a:ln>
+              <a:solidFill>
+                <a:schemeClr val="tx1"/>
+              </a:solidFill>
+            </a:ln>
+          </p:spPr>
+          <p:txBody>
+            <a:bodyPr wrap="square" rtlCol="0" anchor="ctr">
+              <a:noAutofit/>
+            </a:bodyPr>
+            <a:lstStyle/>
+            <a:p>
+              <a:pPr algn="ctr"/>
+              <a:r>
+                <a:rPr lang="pt-BR" sz="1100" dirty="0"/>
+                <a:t>Radio</a:t>
+              </a:r>
+            </a:p>
+          </p:txBody>
+        </p:sp>
+      </p:grpSp>
+      <p:sp>
+        <p:nvSpPr>
+          <p:cNvPr id="32" name="TextBox 31">
+            <a:extLst>
+              <a:ext uri="{FF2B5EF4-FFF2-40B4-BE49-F238E27FC236}">
+                <a16:creationId xmlns:a16="http://schemas.microsoft.com/office/drawing/2014/main" id="{D6D76487-7971-445E-A2F4-987926DB1107}"/>
               </a:ext>
             </a:extLst>
           </p:cNvPr>
@@ -4415,8 +4388,8 @@
         </p:nvSpPr>
         <p:spPr>
           <a:xfrm>
-            <a:off x="5136429" y="1105833"/>
-            <a:ext cx="948267" cy="475488"/>
+            <a:off x="5144346" y="4069167"/>
+            <a:ext cx="914400" cy="228600"/>
           </a:xfrm>
           <a:prstGeom prst="rect">
             <a:avLst/>
@@ -4429,7 +4402,7 @@
           </a:ln>
         </p:spPr>
         <p:txBody>
-          <a:bodyPr wrap="square" rtlCol="0">
+          <a:bodyPr wrap="square" rtlCol="0" anchor="ctr">
             <a:noAutofit/>
           </a:bodyPr>
           <a:lstStyle/>
@@ -4437,30 +4410,82 @@
             <a:pPr algn="ctr"/>
             <a:r>
               <a:rPr lang="pt-BR" sz="1100" dirty="0"/>
-              <a:t>Radio</a:t>
+              <a:t>SD Card</a:t>
             </a:r>
           </a:p>
         </p:txBody>
       </p:sp>
       <p:cxnSp>
         <p:nvCxnSpPr>
-          <p:cNvPr id="3" name="Straight Connector 2">
-            <a:extLst>
-              <a:ext uri="{FF2B5EF4-FFF2-40B4-BE49-F238E27FC236}">
-                <a16:creationId xmlns:a16="http://schemas.microsoft.com/office/drawing/2014/main" id="{788EA2F8-A231-415D-B0AB-D5CA9974E8FD}"/>
+          <p:cNvPr id="43" name="Connector: Elbow 42">
+            <a:extLst>
+              <a:ext uri="{FF2B5EF4-FFF2-40B4-BE49-F238E27FC236}">
+                <a16:creationId xmlns:a16="http://schemas.microsoft.com/office/drawing/2014/main" id="{7234B2D8-6288-4060-97A8-68701003ACFF}"/>
               </a:ext>
             </a:extLst>
           </p:cNvPr>
           <p:cNvCxnSpPr>
-            <a:stCxn id="28" idx="2"/>
-            <a:endCxn id="27" idx="0"/>
+            <a:cxnSpLocks/>
           </p:cNvCxnSpPr>
           <p:nvPr/>
         </p:nvCxnSpPr>
         <p:spPr>
-          <a:xfrm>
-            <a:off x="5610563" y="1581321"/>
-            <a:ext cx="2837" cy="722983"/>
+          <a:xfrm rot="5400000">
+            <a:off x="4466618" y="1633783"/>
+            <a:ext cx="717338" cy="623707"/>
+          </a:xfrm>
+          <a:prstGeom prst="bentConnector3">
+            <a:avLst>
+              <a:gd name="adj1" fmla="val 49998"/>
+            </a:avLst>
+          </a:prstGeom>
+          <a:ln w="19050">
+            <a:solidFill>
+              <a:schemeClr val="tx1"/>
+            </a:solidFill>
+          </a:ln>
+          <a:scene3d>
+            <a:camera prst="orthographicFront">
+              <a:rot lat="0" lon="10800000" rev="0"/>
+            </a:camera>
+            <a:lightRig rig="threePt" dir="t"/>
+          </a:scene3d>
+        </p:spPr>
+        <p:style>
+          <a:lnRef idx="1">
+            <a:schemeClr val="accent1"/>
+          </a:lnRef>
+          <a:fillRef idx="0">
+            <a:schemeClr val="accent1"/>
+          </a:fillRef>
+          <a:effectRef idx="0">
+            <a:schemeClr val="accent1"/>
+          </a:effectRef>
+          <a:fontRef idx="minor">
+            <a:schemeClr val="tx1"/>
+          </a:fontRef>
+        </p:style>
+      </p:cxnSp>
+      <p:cxnSp>
+        <p:nvCxnSpPr>
+          <p:cNvPr id="44" name="Straight Connector 43">
+            <a:extLst>
+              <a:ext uri="{FF2B5EF4-FFF2-40B4-BE49-F238E27FC236}">
+                <a16:creationId xmlns:a16="http://schemas.microsoft.com/office/drawing/2014/main" id="{F0EDD250-78D7-41D0-AA41-2F65FDC5A33B}"/>
+              </a:ext>
+            </a:extLst>
+          </p:cNvPr>
+          <p:cNvCxnSpPr>
+            <a:cxnSpLocks/>
+            <a:stCxn id="49" idx="4"/>
+            <a:endCxn id="32" idx="0"/>
+          </p:cNvCxnSpPr>
+          <p:nvPr/>
+        </p:nvCxnSpPr>
+        <p:spPr>
+          <a:xfrm flipH="1">
+            <a:off x="5601546" y="3662469"/>
+            <a:ext cx="4234" cy="406698"/>
           </a:xfrm>
           <a:prstGeom prst="line">
             <a:avLst/>
@@ -4486,10 +4511,919 @@
           </a:fontRef>
         </p:style>
       </p:cxnSp>
+      <p:sp>
+        <p:nvSpPr>
+          <p:cNvPr id="45" name="Rectangle 44">
+            <a:extLst>
+              <a:ext uri="{FF2B5EF4-FFF2-40B4-BE49-F238E27FC236}">
+                <a16:creationId xmlns:a16="http://schemas.microsoft.com/office/drawing/2014/main" id="{5ECA97FE-3864-4598-B497-2A4B43DE928F}"/>
+              </a:ext>
+            </a:extLst>
+          </p:cNvPr>
+          <p:cNvSpPr/>
+          <p:nvPr/>
+        </p:nvSpPr>
+        <p:spPr>
+          <a:xfrm>
+            <a:off x="528320" y="777240"/>
+            <a:ext cx="9357360" cy="4033520"/>
+          </a:xfrm>
+          <a:prstGeom prst="rect">
+            <a:avLst/>
+          </a:prstGeom>
+          <a:noFill/>
+          <a:ln>
+            <a:solidFill>
+              <a:schemeClr val="tx1"/>
+            </a:solidFill>
+            <a:prstDash val="dash"/>
+          </a:ln>
+        </p:spPr>
+        <p:style>
+          <a:lnRef idx="2">
+            <a:schemeClr val="accent1">
+              <a:shade val="50000"/>
+            </a:schemeClr>
+          </a:lnRef>
+          <a:fillRef idx="1">
+            <a:schemeClr val="accent1"/>
+          </a:fillRef>
+          <a:effectRef idx="0">
+            <a:schemeClr val="accent1"/>
+          </a:effectRef>
+          <a:fontRef idx="minor">
+            <a:schemeClr val="lt1"/>
+          </a:fontRef>
+        </p:style>
+        <p:txBody>
+          <a:bodyPr rtlCol="0" anchor="ctr"/>
+          <a:lstStyle/>
+          <a:p>
+            <a:pPr algn="ctr"/>
+            <a:endParaRPr lang="en-US"/>
+          </a:p>
+        </p:txBody>
+      </p:sp>
+      <p:sp>
+        <p:nvSpPr>
+          <p:cNvPr id="47" name="TextBox 46">
+            <a:extLst>
+              <a:ext uri="{FF2B5EF4-FFF2-40B4-BE49-F238E27FC236}">
+                <a16:creationId xmlns:a16="http://schemas.microsoft.com/office/drawing/2014/main" id="{362CB846-4260-4C4C-82AF-88B44F0EC03D}"/>
+              </a:ext>
+            </a:extLst>
+          </p:cNvPr>
+          <p:cNvSpPr txBox="1"/>
+          <p:nvPr/>
+        </p:nvSpPr>
+        <p:spPr>
+          <a:xfrm>
+            <a:off x="604520" y="858520"/>
+            <a:ext cx="1988374" cy="369332"/>
+          </a:xfrm>
+          <a:prstGeom prst="rect">
+            <a:avLst/>
+          </a:prstGeom>
+          <a:noFill/>
+        </p:spPr>
+        <p:txBody>
+          <a:bodyPr wrap="square" rtlCol="0">
+            <a:spAutoFit/>
+          </a:bodyPr>
+          <a:lstStyle/>
+          <a:p>
+            <a:r>
+              <a:rPr lang="en-US" dirty="0"/>
+              <a:t>UAV Gimbal</a:t>
+            </a:r>
+          </a:p>
+        </p:txBody>
+      </p:sp>
+      <p:grpSp>
+        <p:nvGrpSpPr>
+          <p:cNvPr id="80" name="Group 79">
+            <a:extLst>
+              <a:ext uri="{FF2B5EF4-FFF2-40B4-BE49-F238E27FC236}">
+                <a16:creationId xmlns:a16="http://schemas.microsoft.com/office/drawing/2014/main" id="{F6946E8E-4D7E-4954-9722-7EF221B252FB}"/>
+              </a:ext>
+            </a:extLst>
+          </p:cNvPr>
+          <p:cNvGrpSpPr/>
+          <p:nvPr/>
+        </p:nvGrpSpPr>
+        <p:grpSpPr>
+          <a:xfrm>
+            <a:off x="4465324" y="2313471"/>
+            <a:ext cx="2280911" cy="1348998"/>
+            <a:chOff x="4465324" y="2313471"/>
+            <a:chExt cx="2280911" cy="1348998"/>
+          </a:xfrm>
+        </p:grpSpPr>
+        <p:sp>
+          <p:nvSpPr>
+            <p:cNvPr id="49" name="Parallelogram 48">
+              <a:extLst>
+                <a:ext uri="{FF2B5EF4-FFF2-40B4-BE49-F238E27FC236}">
+                  <a16:creationId xmlns:a16="http://schemas.microsoft.com/office/drawing/2014/main" id="{D94E6E50-41C5-442D-A93E-C274D1B5ABAB}"/>
+                </a:ext>
+              </a:extLst>
+            </p:cNvPr>
+            <p:cNvSpPr/>
+            <p:nvPr/>
+          </p:nvSpPr>
+          <p:spPr>
+            <a:xfrm>
+              <a:off x="4465324" y="2313471"/>
+              <a:ext cx="2280911" cy="1348998"/>
+            </a:xfrm>
+            <a:prstGeom prst="parallelogram">
+              <a:avLst/>
+            </a:prstGeom>
+            <a:noFill/>
+            <a:ln>
+              <a:solidFill>
+                <a:schemeClr val="tx1"/>
+              </a:solidFill>
+            </a:ln>
+          </p:spPr>
+          <p:style>
+            <a:lnRef idx="2">
+              <a:schemeClr val="accent1">
+                <a:shade val="50000"/>
+              </a:schemeClr>
+            </a:lnRef>
+            <a:fillRef idx="1">
+              <a:schemeClr val="accent1"/>
+            </a:fillRef>
+            <a:effectRef idx="0">
+              <a:schemeClr val="accent1"/>
+            </a:effectRef>
+            <a:fontRef idx="minor">
+              <a:schemeClr val="lt1"/>
+            </a:fontRef>
+          </p:style>
+          <p:txBody>
+            <a:bodyPr rtlCol="0" anchor="ctr"/>
+            <a:lstStyle/>
+            <a:p>
+              <a:pPr algn="ctr"/>
+              <a:endParaRPr lang="en-US"/>
+            </a:p>
+          </p:txBody>
+        </p:sp>
+        <p:sp>
+          <p:nvSpPr>
+            <p:cNvPr id="58" name="TextBox 57">
+              <a:extLst>
+                <a:ext uri="{FF2B5EF4-FFF2-40B4-BE49-F238E27FC236}">
+                  <a16:creationId xmlns:a16="http://schemas.microsoft.com/office/drawing/2014/main" id="{0CA3F1BD-8523-4C70-AD54-CAC68374707C}"/>
+                </a:ext>
+              </a:extLst>
+            </p:cNvPr>
+            <p:cNvSpPr txBox="1"/>
+            <p:nvPr/>
+          </p:nvSpPr>
+          <p:spPr>
+            <a:xfrm>
+              <a:off x="5228431" y="2748000"/>
+              <a:ext cx="769938" cy="366029"/>
+            </a:xfrm>
+            <a:prstGeom prst="rect">
+              <a:avLst/>
+            </a:prstGeom>
+            <a:noFill/>
+            <a:ln>
+              <a:noFill/>
+            </a:ln>
+          </p:spPr>
+          <p:txBody>
+            <a:bodyPr wrap="square" rtlCol="0" anchor="ctr">
+              <a:noAutofit/>
+            </a:bodyPr>
+            <a:lstStyle/>
+            <a:p>
+              <a:pPr algn="ctr"/>
+              <a:r>
+                <a:rPr lang="pt-BR" sz="1100" dirty="0"/>
+                <a:t>Gimbal Control</a:t>
+              </a:r>
+            </a:p>
+          </p:txBody>
+        </p:sp>
+      </p:grpSp>
+      <p:grpSp>
+        <p:nvGrpSpPr>
+          <p:cNvPr id="79" name="Group 78">
+            <a:extLst>
+              <a:ext uri="{FF2B5EF4-FFF2-40B4-BE49-F238E27FC236}">
+                <a16:creationId xmlns:a16="http://schemas.microsoft.com/office/drawing/2014/main" id="{F529BCA3-D678-4A8C-BF10-7E3B5AF938A0}"/>
+              </a:ext>
+            </a:extLst>
+          </p:cNvPr>
+          <p:cNvGrpSpPr/>
+          <p:nvPr/>
+        </p:nvGrpSpPr>
+        <p:grpSpPr>
+          <a:xfrm>
+            <a:off x="3421658" y="3991681"/>
+            <a:ext cx="1343377" cy="666679"/>
+            <a:chOff x="3421658" y="3991681"/>
+            <a:chExt cx="1343377" cy="666679"/>
+          </a:xfrm>
+        </p:grpSpPr>
+        <p:sp>
+          <p:nvSpPr>
+            <p:cNvPr id="70" name="Cube 69">
+              <a:extLst>
+                <a:ext uri="{FF2B5EF4-FFF2-40B4-BE49-F238E27FC236}">
+                  <a16:creationId xmlns:a16="http://schemas.microsoft.com/office/drawing/2014/main" id="{95785E77-EAF3-4760-8158-65C4213BE489}"/>
+                </a:ext>
+              </a:extLst>
+            </p:cNvPr>
+            <p:cNvSpPr/>
+            <p:nvPr/>
+          </p:nvSpPr>
+          <p:spPr>
+            <a:xfrm>
+              <a:off x="3421658" y="3991681"/>
+              <a:ext cx="1343377" cy="666679"/>
+            </a:xfrm>
+            <a:prstGeom prst="cube">
+              <a:avLst/>
+            </a:prstGeom>
+            <a:noFill/>
+            <a:ln>
+              <a:solidFill>
+                <a:schemeClr val="tx1"/>
+              </a:solidFill>
+            </a:ln>
+          </p:spPr>
+          <p:style>
+            <a:lnRef idx="2">
+              <a:schemeClr val="accent1">
+                <a:shade val="50000"/>
+              </a:schemeClr>
+            </a:lnRef>
+            <a:fillRef idx="1">
+              <a:schemeClr val="accent1"/>
+            </a:fillRef>
+            <a:effectRef idx="0">
+              <a:schemeClr val="accent1"/>
+            </a:effectRef>
+            <a:fontRef idx="minor">
+              <a:schemeClr val="lt1"/>
+            </a:fontRef>
+          </p:style>
+          <p:txBody>
+            <a:bodyPr rtlCol="0" anchor="ctr"/>
+            <a:lstStyle/>
+            <a:p>
+              <a:pPr algn="ctr"/>
+              <a:endParaRPr lang="en-US"/>
+            </a:p>
+          </p:txBody>
+        </p:sp>
+        <p:sp>
+          <p:nvSpPr>
+            <p:cNvPr id="73" name="TextBox 72">
+              <a:extLst>
+                <a:ext uri="{FF2B5EF4-FFF2-40B4-BE49-F238E27FC236}">
+                  <a16:creationId xmlns:a16="http://schemas.microsoft.com/office/drawing/2014/main" id="{10DE4E3F-E56D-4F8A-B7A0-1133699778B3}"/>
+                </a:ext>
+              </a:extLst>
+            </p:cNvPr>
+            <p:cNvSpPr txBox="1"/>
+            <p:nvPr/>
+          </p:nvSpPr>
+          <p:spPr>
+            <a:xfrm>
+              <a:off x="3561080" y="4287591"/>
+              <a:ext cx="914400" cy="228600"/>
+            </a:xfrm>
+            <a:prstGeom prst="rect">
+              <a:avLst/>
+            </a:prstGeom>
+            <a:noFill/>
+            <a:ln>
+              <a:noFill/>
+            </a:ln>
+          </p:spPr>
+          <p:txBody>
+            <a:bodyPr wrap="square" rtlCol="0" anchor="ctr">
+              <a:noAutofit/>
+            </a:bodyPr>
+            <a:lstStyle/>
+            <a:p>
+              <a:pPr algn="ctr"/>
+              <a:r>
+                <a:rPr lang="pt-BR" sz="1100" dirty="0"/>
+                <a:t>Processor</a:t>
+              </a:r>
+            </a:p>
+          </p:txBody>
+        </p:sp>
+      </p:grpSp>
+      <p:grpSp>
+        <p:nvGrpSpPr>
+          <p:cNvPr id="78" name="Group 77">
+            <a:extLst>
+              <a:ext uri="{FF2B5EF4-FFF2-40B4-BE49-F238E27FC236}">
+                <a16:creationId xmlns:a16="http://schemas.microsoft.com/office/drawing/2014/main" id="{912B3F09-6C10-47F3-B963-1820CB0F2301}"/>
+              </a:ext>
+            </a:extLst>
+          </p:cNvPr>
+          <p:cNvGrpSpPr/>
+          <p:nvPr/>
+        </p:nvGrpSpPr>
+        <p:grpSpPr>
+          <a:xfrm>
+            <a:off x="1752601" y="4151498"/>
+            <a:ext cx="1289746" cy="473185"/>
+            <a:chOff x="1752601" y="4151498"/>
+            <a:chExt cx="1289746" cy="473185"/>
+          </a:xfrm>
+        </p:grpSpPr>
+        <p:sp>
+          <p:nvSpPr>
+            <p:cNvPr id="74" name="Arrow: Left-Right 73">
+              <a:extLst>
+                <a:ext uri="{FF2B5EF4-FFF2-40B4-BE49-F238E27FC236}">
+                  <a16:creationId xmlns:a16="http://schemas.microsoft.com/office/drawing/2014/main" id="{413D3C12-866F-41EF-B5D0-20D93C07A951}"/>
+                </a:ext>
+              </a:extLst>
+            </p:cNvPr>
+            <p:cNvSpPr/>
+            <p:nvPr/>
+          </p:nvSpPr>
+          <p:spPr>
+            <a:xfrm>
+              <a:off x="1752601" y="4151498"/>
+              <a:ext cx="1289746" cy="473185"/>
+            </a:xfrm>
+            <a:prstGeom prst="leftRightArrow">
+              <a:avLst/>
+            </a:prstGeom>
+            <a:noFill/>
+            <a:ln>
+              <a:solidFill>
+                <a:schemeClr val="tx1"/>
+              </a:solidFill>
+            </a:ln>
+          </p:spPr>
+          <p:style>
+            <a:lnRef idx="2">
+              <a:schemeClr val="accent1">
+                <a:shade val="50000"/>
+              </a:schemeClr>
+            </a:lnRef>
+            <a:fillRef idx="1">
+              <a:schemeClr val="accent1"/>
+            </a:fillRef>
+            <a:effectRef idx="0">
+              <a:schemeClr val="accent1"/>
+            </a:effectRef>
+            <a:fontRef idx="minor">
+              <a:schemeClr val="lt1"/>
+            </a:fontRef>
+          </p:style>
+          <p:txBody>
+            <a:bodyPr rtlCol="0" anchor="ctr"/>
+            <a:lstStyle/>
+            <a:p>
+              <a:pPr algn="ctr"/>
+              <a:endParaRPr lang="en-US"/>
+            </a:p>
+          </p:txBody>
+        </p:sp>
+        <p:sp>
+          <p:nvSpPr>
+            <p:cNvPr id="75" name="TextBox 74">
+              <a:extLst>
+                <a:ext uri="{FF2B5EF4-FFF2-40B4-BE49-F238E27FC236}">
+                  <a16:creationId xmlns:a16="http://schemas.microsoft.com/office/drawing/2014/main" id="{2413A615-32B8-4120-85C3-21499749AD67}"/>
+                </a:ext>
+              </a:extLst>
+            </p:cNvPr>
+            <p:cNvSpPr txBox="1"/>
+            <p:nvPr/>
+          </p:nvSpPr>
+          <p:spPr>
+            <a:xfrm>
+              <a:off x="1940560" y="4267271"/>
+              <a:ext cx="914400" cy="228600"/>
+            </a:xfrm>
+            <a:prstGeom prst="rect">
+              <a:avLst/>
+            </a:prstGeom>
+            <a:noFill/>
+            <a:ln>
+              <a:noFill/>
+            </a:ln>
+          </p:spPr>
+          <p:txBody>
+            <a:bodyPr wrap="square" rtlCol="0" anchor="ctr">
+              <a:noAutofit/>
+            </a:bodyPr>
+            <a:lstStyle/>
+            <a:p>
+              <a:pPr algn="ctr"/>
+              <a:r>
+                <a:rPr lang="pt-BR" sz="1100" dirty="0"/>
+                <a:t>Bus Memory</a:t>
+              </a:r>
+            </a:p>
+          </p:txBody>
+        </p:sp>
+      </p:grpSp>
     </p:spTree>
     <p:extLst>
       <p:ext uri="{BB962C8B-B14F-4D97-AF65-F5344CB8AC3E}">
         <p14:creationId xmlns:p14="http://schemas.microsoft.com/office/powerpoint/2010/main" val="2157991286"/>
+      </p:ext>
+    </p:extLst>
+  </p:cSld>
+  <p:clrMapOvr>
+    <a:masterClrMapping/>
+  </p:clrMapOvr>
+</p:sld>
+</file>
+
+<file path=ppt/slides/slide2.xml><?xml version="1.0" encoding="utf-8"?>
+<p:sld xmlns:a="http://schemas.openxmlformats.org/drawingml/2006/main" xmlns:r="http://schemas.openxmlformats.org/officeDocument/2006/relationships" xmlns:p="http://schemas.openxmlformats.org/presentationml/2006/main">
+  <p:cSld>
+    <p:spTree>
+      <p:nvGrpSpPr>
+        <p:cNvPr id="1" name=""/>
+        <p:cNvGrpSpPr/>
+        <p:nvPr/>
+      </p:nvGrpSpPr>
+      <p:grpSpPr>
+        <a:xfrm>
+          <a:off x="0" y="0"/>
+          <a:ext cx="0" cy="0"/>
+          <a:chOff x="0" y="0"/>
+          <a:chExt cx="0" cy="0"/>
+        </a:xfrm>
+      </p:grpSpPr>
+      <p:sp>
+        <p:nvSpPr>
+          <p:cNvPr id="3" name="Parallelogram 2">
+            <a:extLst>
+              <a:ext uri="{FF2B5EF4-FFF2-40B4-BE49-F238E27FC236}">
+                <a16:creationId xmlns:a16="http://schemas.microsoft.com/office/drawing/2014/main" id="{7A28F2FC-DF99-450D-856D-7BED924AA136}"/>
+              </a:ext>
+            </a:extLst>
+          </p:cNvPr>
+          <p:cNvSpPr/>
+          <p:nvPr/>
+        </p:nvSpPr>
+        <p:spPr>
+          <a:xfrm>
+            <a:off x="1193804" y="1282230"/>
+            <a:ext cx="4714236" cy="3355809"/>
+          </a:xfrm>
+          <a:prstGeom prst="parallelogram">
+            <a:avLst/>
+          </a:prstGeom>
+          <a:noFill/>
+          <a:ln>
+            <a:solidFill>
+              <a:schemeClr val="tx1"/>
+            </a:solidFill>
+          </a:ln>
+        </p:spPr>
+        <p:style>
+          <a:lnRef idx="2">
+            <a:schemeClr val="accent1">
+              <a:shade val="50000"/>
+            </a:schemeClr>
+          </a:lnRef>
+          <a:fillRef idx="1">
+            <a:schemeClr val="accent1"/>
+          </a:fillRef>
+          <a:effectRef idx="0">
+            <a:schemeClr val="accent1"/>
+          </a:effectRef>
+          <a:fontRef idx="minor">
+            <a:schemeClr val="lt1"/>
+          </a:fontRef>
+        </p:style>
+        <p:txBody>
+          <a:bodyPr rtlCol="0" anchor="ctr"/>
+          <a:lstStyle/>
+          <a:p>
+            <a:pPr algn="ctr"/>
+            <a:endParaRPr lang="en-US"/>
+          </a:p>
+        </p:txBody>
+      </p:sp>
+      <p:sp>
+        <p:nvSpPr>
+          <p:cNvPr id="4" name="TextBox 3">
+            <a:extLst>
+              <a:ext uri="{FF2B5EF4-FFF2-40B4-BE49-F238E27FC236}">
+                <a16:creationId xmlns:a16="http://schemas.microsoft.com/office/drawing/2014/main" id="{1C1A63B7-315D-4F8A-B3C2-4CAF56DCCD84}"/>
+              </a:ext>
+            </a:extLst>
+          </p:cNvPr>
+          <p:cNvSpPr txBox="1"/>
+          <p:nvPr/>
+        </p:nvSpPr>
+        <p:spPr>
+          <a:xfrm>
+            <a:off x="2054542" y="1386560"/>
+            <a:ext cx="1059498" cy="366029"/>
+          </a:xfrm>
+          <a:prstGeom prst="rect">
+            <a:avLst/>
+          </a:prstGeom>
+          <a:noFill/>
+          <a:ln>
+            <a:noFill/>
+          </a:ln>
+        </p:spPr>
+        <p:txBody>
+          <a:bodyPr wrap="square" rtlCol="0" anchor="ctr">
+            <a:noAutofit/>
+          </a:bodyPr>
+          <a:lstStyle/>
+          <a:p>
+            <a:pPr algn="ctr"/>
+            <a:r>
+              <a:rPr lang="pt-BR" sz="1100" dirty="0"/>
+              <a:t>Gimbal Control</a:t>
+            </a:r>
+          </a:p>
+        </p:txBody>
+      </p:sp>
+      <p:sp>
+        <p:nvSpPr>
+          <p:cNvPr id="5" name="Parallelogram 4">
+            <a:extLst>
+              <a:ext uri="{FF2B5EF4-FFF2-40B4-BE49-F238E27FC236}">
+                <a16:creationId xmlns:a16="http://schemas.microsoft.com/office/drawing/2014/main" id="{D0CDB014-CC5D-4A37-B7DB-ED6C1CF843EB}"/>
+              </a:ext>
+            </a:extLst>
+          </p:cNvPr>
+          <p:cNvSpPr/>
+          <p:nvPr/>
+        </p:nvSpPr>
+        <p:spPr>
+          <a:xfrm>
+            <a:off x="1561782" y="3144789"/>
+            <a:ext cx="1323658" cy="939800"/>
+          </a:xfrm>
+          <a:prstGeom prst="parallelogram">
+            <a:avLst/>
+          </a:prstGeom>
+          <a:noFill/>
+          <a:ln>
+            <a:solidFill>
+              <a:schemeClr val="tx1"/>
+            </a:solidFill>
+          </a:ln>
+        </p:spPr>
+        <p:style>
+          <a:lnRef idx="2">
+            <a:schemeClr val="accent1">
+              <a:shade val="50000"/>
+            </a:schemeClr>
+          </a:lnRef>
+          <a:fillRef idx="1">
+            <a:schemeClr val="accent1"/>
+          </a:fillRef>
+          <a:effectRef idx="0">
+            <a:schemeClr val="accent1"/>
+          </a:effectRef>
+          <a:fontRef idx="minor">
+            <a:schemeClr val="lt1"/>
+          </a:fontRef>
+        </p:style>
+        <p:txBody>
+          <a:bodyPr rtlCol="0" anchor="ctr"/>
+          <a:lstStyle/>
+          <a:p>
+            <a:pPr algn="ctr"/>
+            <a:endParaRPr lang="en-US"/>
+          </a:p>
+        </p:txBody>
+      </p:sp>
+      <p:sp>
+        <p:nvSpPr>
+          <p:cNvPr id="10" name="TextBox 9">
+            <a:extLst>
+              <a:ext uri="{FF2B5EF4-FFF2-40B4-BE49-F238E27FC236}">
+                <a16:creationId xmlns:a16="http://schemas.microsoft.com/office/drawing/2014/main" id="{F64BA6C3-3C7D-49C0-8F0F-18A7B17752B3}"/>
+              </a:ext>
+            </a:extLst>
+          </p:cNvPr>
+          <p:cNvSpPr txBox="1"/>
+          <p:nvPr/>
+        </p:nvSpPr>
+        <p:spPr>
+          <a:xfrm>
+            <a:off x="1766411" y="3500389"/>
+            <a:ext cx="914400" cy="228600"/>
+          </a:xfrm>
+          <a:prstGeom prst="rect">
+            <a:avLst/>
+          </a:prstGeom>
+          <a:noFill/>
+          <a:ln>
+            <a:noFill/>
+          </a:ln>
+        </p:spPr>
+        <p:txBody>
+          <a:bodyPr wrap="square" rtlCol="0" anchor="ctr">
+            <a:noAutofit/>
+          </a:bodyPr>
+          <a:lstStyle/>
+          <a:p>
+            <a:pPr algn="ctr"/>
+            <a:r>
+              <a:rPr lang="pt-BR" sz="1100" dirty="0"/>
+              <a:t>Thread</a:t>
+            </a:r>
+          </a:p>
+        </p:txBody>
+      </p:sp>
+      <p:sp>
+        <p:nvSpPr>
+          <p:cNvPr id="11" name="Parallelogram 10">
+            <a:extLst>
+              <a:ext uri="{FF2B5EF4-FFF2-40B4-BE49-F238E27FC236}">
+                <a16:creationId xmlns:a16="http://schemas.microsoft.com/office/drawing/2014/main" id="{3F39B083-DFDD-4636-8CD1-1912802A55E0}"/>
+              </a:ext>
+            </a:extLst>
+          </p:cNvPr>
+          <p:cNvSpPr/>
+          <p:nvPr/>
+        </p:nvSpPr>
+        <p:spPr>
+          <a:xfrm>
+            <a:off x="2162651" y="1927860"/>
+            <a:ext cx="1323658" cy="939800"/>
+          </a:xfrm>
+          <a:prstGeom prst="parallelogram">
+            <a:avLst/>
+          </a:prstGeom>
+          <a:noFill/>
+          <a:ln>
+            <a:solidFill>
+              <a:schemeClr val="tx1"/>
+            </a:solidFill>
+          </a:ln>
+        </p:spPr>
+        <p:style>
+          <a:lnRef idx="2">
+            <a:schemeClr val="accent1">
+              <a:shade val="50000"/>
+            </a:schemeClr>
+          </a:lnRef>
+          <a:fillRef idx="1">
+            <a:schemeClr val="accent1"/>
+          </a:fillRef>
+          <a:effectRef idx="0">
+            <a:schemeClr val="accent1"/>
+          </a:effectRef>
+          <a:fontRef idx="minor">
+            <a:schemeClr val="lt1"/>
+          </a:fontRef>
+        </p:style>
+        <p:txBody>
+          <a:bodyPr rtlCol="0" anchor="ctr"/>
+          <a:lstStyle/>
+          <a:p>
+            <a:pPr algn="ctr"/>
+            <a:endParaRPr lang="en-US"/>
+          </a:p>
+        </p:txBody>
+      </p:sp>
+      <p:sp>
+        <p:nvSpPr>
+          <p:cNvPr id="12" name="TextBox 11">
+            <a:extLst>
+              <a:ext uri="{FF2B5EF4-FFF2-40B4-BE49-F238E27FC236}">
+                <a16:creationId xmlns:a16="http://schemas.microsoft.com/office/drawing/2014/main" id="{8F395772-F3FC-4C05-A30B-6F9DF49CD59E}"/>
+              </a:ext>
+            </a:extLst>
+          </p:cNvPr>
+          <p:cNvSpPr txBox="1"/>
+          <p:nvPr/>
+        </p:nvSpPr>
+        <p:spPr>
+          <a:xfrm>
+            <a:off x="2367280" y="2283460"/>
+            <a:ext cx="914400" cy="228600"/>
+          </a:xfrm>
+          <a:prstGeom prst="rect">
+            <a:avLst/>
+          </a:prstGeom>
+          <a:noFill/>
+          <a:ln>
+            <a:noFill/>
+          </a:ln>
+        </p:spPr>
+        <p:txBody>
+          <a:bodyPr wrap="square" rtlCol="0" anchor="ctr">
+            <a:noAutofit/>
+          </a:bodyPr>
+          <a:lstStyle/>
+          <a:p>
+            <a:pPr algn="ctr"/>
+            <a:r>
+              <a:rPr lang="pt-BR" sz="1100" dirty="0"/>
+              <a:t>Thread</a:t>
+            </a:r>
+          </a:p>
+        </p:txBody>
+      </p:sp>
+      <p:sp>
+        <p:nvSpPr>
+          <p:cNvPr id="13" name="Parallelogram 12">
+            <a:extLst>
+              <a:ext uri="{FF2B5EF4-FFF2-40B4-BE49-F238E27FC236}">
+                <a16:creationId xmlns:a16="http://schemas.microsoft.com/office/drawing/2014/main" id="{333DB13D-126E-41AE-95AB-23FA1DDE306B}"/>
+              </a:ext>
+            </a:extLst>
+          </p:cNvPr>
+          <p:cNvSpPr/>
+          <p:nvPr/>
+        </p:nvSpPr>
+        <p:spPr>
+          <a:xfrm>
+            <a:off x="3690938" y="1927860"/>
+            <a:ext cx="1323658" cy="939800"/>
+          </a:xfrm>
+          <a:prstGeom prst="parallelogram">
+            <a:avLst/>
+          </a:prstGeom>
+          <a:noFill/>
+          <a:ln>
+            <a:solidFill>
+              <a:schemeClr val="tx1"/>
+            </a:solidFill>
+          </a:ln>
+        </p:spPr>
+        <p:style>
+          <a:lnRef idx="2">
+            <a:schemeClr val="accent1">
+              <a:shade val="50000"/>
+            </a:schemeClr>
+          </a:lnRef>
+          <a:fillRef idx="1">
+            <a:schemeClr val="accent1"/>
+          </a:fillRef>
+          <a:effectRef idx="0">
+            <a:schemeClr val="accent1"/>
+          </a:effectRef>
+          <a:fontRef idx="minor">
+            <a:schemeClr val="lt1"/>
+          </a:fontRef>
+        </p:style>
+        <p:txBody>
+          <a:bodyPr rtlCol="0" anchor="ctr"/>
+          <a:lstStyle/>
+          <a:p>
+            <a:pPr algn="ctr"/>
+            <a:endParaRPr lang="en-US"/>
+          </a:p>
+        </p:txBody>
+      </p:sp>
+      <p:sp>
+        <p:nvSpPr>
+          <p:cNvPr id="14" name="TextBox 13">
+            <a:extLst>
+              <a:ext uri="{FF2B5EF4-FFF2-40B4-BE49-F238E27FC236}">
+                <a16:creationId xmlns:a16="http://schemas.microsoft.com/office/drawing/2014/main" id="{849A6A8B-CB07-45D7-86EA-7DEAF872FD5F}"/>
+              </a:ext>
+            </a:extLst>
+          </p:cNvPr>
+          <p:cNvSpPr txBox="1"/>
+          <p:nvPr/>
+        </p:nvSpPr>
+        <p:spPr>
+          <a:xfrm>
+            <a:off x="3895567" y="2283460"/>
+            <a:ext cx="914400" cy="228600"/>
+          </a:xfrm>
+          <a:prstGeom prst="rect">
+            <a:avLst/>
+          </a:prstGeom>
+          <a:noFill/>
+          <a:ln>
+            <a:noFill/>
+          </a:ln>
+        </p:spPr>
+        <p:txBody>
+          <a:bodyPr wrap="square" rtlCol="0" anchor="ctr">
+            <a:noAutofit/>
+          </a:bodyPr>
+          <a:lstStyle/>
+          <a:p>
+            <a:pPr algn="ctr"/>
+            <a:r>
+              <a:rPr lang="pt-BR" sz="1100" dirty="0"/>
+              <a:t>Thread</a:t>
+            </a:r>
+          </a:p>
+        </p:txBody>
+      </p:sp>
+      <p:sp>
+        <p:nvSpPr>
+          <p:cNvPr id="15" name="Parallelogram 14">
+            <a:extLst>
+              <a:ext uri="{FF2B5EF4-FFF2-40B4-BE49-F238E27FC236}">
+                <a16:creationId xmlns:a16="http://schemas.microsoft.com/office/drawing/2014/main" id="{B4AB96AD-AECD-41F3-ACA3-72D9AFCDD385}"/>
+              </a:ext>
+            </a:extLst>
+          </p:cNvPr>
+          <p:cNvSpPr/>
+          <p:nvPr/>
+        </p:nvSpPr>
+        <p:spPr>
+          <a:xfrm>
+            <a:off x="3073082" y="3144789"/>
+            <a:ext cx="1323658" cy="939800"/>
+          </a:xfrm>
+          <a:prstGeom prst="parallelogram">
+            <a:avLst/>
+          </a:prstGeom>
+          <a:noFill/>
+          <a:ln>
+            <a:solidFill>
+              <a:schemeClr val="tx1"/>
+            </a:solidFill>
+          </a:ln>
+        </p:spPr>
+        <p:style>
+          <a:lnRef idx="2">
+            <a:schemeClr val="accent1">
+              <a:shade val="50000"/>
+            </a:schemeClr>
+          </a:lnRef>
+          <a:fillRef idx="1">
+            <a:schemeClr val="accent1"/>
+          </a:fillRef>
+          <a:effectRef idx="0">
+            <a:schemeClr val="accent1"/>
+          </a:effectRef>
+          <a:fontRef idx="minor">
+            <a:schemeClr val="lt1"/>
+          </a:fontRef>
+        </p:style>
+        <p:txBody>
+          <a:bodyPr rtlCol="0" anchor="ctr"/>
+          <a:lstStyle/>
+          <a:p>
+            <a:pPr algn="ctr"/>
+            <a:endParaRPr lang="en-US"/>
+          </a:p>
+        </p:txBody>
+      </p:sp>
+      <p:sp>
+        <p:nvSpPr>
+          <p:cNvPr id="16" name="TextBox 15">
+            <a:extLst>
+              <a:ext uri="{FF2B5EF4-FFF2-40B4-BE49-F238E27FC236}">
+                <a16:creationId xmlns:a16="http://schemas.microsoft.com/office/drawing/2014/main" id="{8668C961-372F-43E4-9416-AD6DE71E7E8F}"/>
+              </a:ext>
+            </a:extLst>
+          </p:cNvPr>
+          <p:cNvSpPr txBox="1"/>
+          <p:nvPr/>
+        </p:nvSpPr>
+        <p:spPr>
+          <a:xfrm>
+            <a:off x="3277711" y="3500389"/>
+            <a:ext cx="914400" cy="228600"/>
+          </a:xfrm>
+          <a:prstGeom prst="rect">
+            <a:avLst/>
+          </a:prstGeom>
+          <a:noFill/>
+          <a:ln>
+            <a:noFill/>
+          </a:ln>
+        </p:spPr>
+        <p:txBody>
+          <a:bodyPr wrap="square" rtlCol="0" anchor="ctr">
+            <a:noAutofit/>
+          </a:bodyPr>
+          <a:lstStyle/>
+          <a:p>
+            <a:pPr algn="ctr"/>
+            <a:r>
+              <a:rPr lang="pt-BR" sz="1100" dirty="0"/>
+              <a:t>Thread</a:t>
+            </a:r>
+          </a:p>
+        </p:txBody>
+      </p:sp>
+    </p:spTree>
+    <p:extLst>
+      <p:ext uri="{BB962C8B-B14F-4D97-AF65-F5344CB8AC3E}">
+        <p14:creationId xmlns:p14="http://schemas.microsoft.com/office/powerpoint/2010/main" val="2227812922"/>
       </p:ext>
     </p:extLst>
   </p:cSld>

</xml_diff>

<commit_message>
Added threads and thread connections. Fixed the warning. Created process diagram. Made modifications on 'tipo_de_dados.aadl', 'dispositivos.aadl', 'threads_file.aadl' and docs.
</commit_message>
<xml_diff>
--- a/docs/ARP_CAM_System.pptx
+++ b/docs/ARP_CAM_System.pptx
@@ -4979,8 +4979,8 @@
         </p:nvSpPr>
         <p:spPr>
           <a:xfrm>
-            <a:off x="1193804" y="1282230"/>
-            <a:ext cx="4714236" cy="3355809"/>
+            <a:off x="1193803" y="1282230"/>
+            <a:ext cx="5720641" cy="3355809"/>
           </a:xfrm>
           <a:prstGeom prst="parallelogram">
             <a:avLst/>
@@ -5070,8 +5070,8 @@
         </p:nvSpPr>
         <p:spPr>
           <a:xfrm>
-            <a:off x="1561782" y="3144789"/>
-            <a:ext cx="1323658" cy="939800"/>
+            <a:off x="1863299" y="3144789"/>
+            <a:ext cx="1828800" cy="914400"/>
           </a:xfrm>
           <a:prstGeom prst="parallelogram">
             <a:avLst/>
@@ -5122,8 +5122,8 @@
         </p:nvSpPr>
         <p:spPr>
           <a:xfrm>
-            <a:off x="1766411" y="3500389"/>
-            <a:ext cx="914400" cy="228600"/>
+            <a:off x="1963883" y="3373389"/>
+            <a:ext cx="1627632" cy="457200"/>
           </a:xfrm>
           <a:prstGeom prst="rect">
             <a:avLst/>
@@ -5142,7 +5142,7 @@
             <a:pPr algn="ctr"/>
             <a:r>
               <a:rPr lang="pt-BR" sz="1100" dirty="0"/>
-              <a:t>Thread</a:t>
+              <a:t>thread get_attitude</a:t>
             </a:r>
           </a:p>
         </p:txBody>
@@ -5161,8 +5161,8 @@
         </p:nvSpPr>
         <p:spPr>
           <a:xfrm>
-            <a:off x="2162651" y="1927860"/>
-            <a:ext cx="1323658" cy="939800"/>
+            <a:off x="2162650" y="1927860"/>
+            <a:ext cx="1828800" cy="914400"/>
           </a:xfrm>
           <a:prstGeom prst="parallelogram">
             <a:avLst/>
@@ -5213,8 +5213,8 @@
         </p:nvSpPr>
         <p:spPr>
           <a:xfrm>
-            <a:off x="2367280" y="2283460"/>
-            <a:ext cx="914400" cy="228600"/>
+            <a:off x="2263234" y="2156460"/>
+            <a:ext cx="1627632" cy="457200"/>
           </a:xfrm>
           <a:prstGeom prst="rect">
             <a:avLst/>
@@ -5233,7 +5233,7 @@
             <a:pPr algn="ctr"/>
             <a:r>
               <a:rPr lang="pt-BR" sz="1100" dirty="0"/>
-              <a:t>Thread</a:t>
+              <a:t>thread get_radio_command</a:t>
             </a:r>
           </a:p>
         </p:txBody>
@@ -5252,8 +5252,8 @@
         </p:nvSpPr>
         <p:spPr>
           <a:xfrm>
-            <a:off x="3690938" y="1927860"/>
-            <a:ext cx="1323658" cy="939800"/>
+            <a:off x="4366488" y="1927860"/>
+            <a:ext cx="1828800" cy="914400"/>
           </a:xfrm>
           <a:prstGeom prst="parallelogram">
             <a:avLst/>
@@ -5304,8 +5304,8 @@
         </p:nvSpPr>
         <p:spPr>
           <a:xfrm>
-            <a:off x="3895567" y="2283460"/>
-            <a:ext cx="914400" cy="228600"/>
+            <a:off x="4467072" y="2156460"/>
+            <a:ext cx="1627632" cy="457200"/>
           </a:xfrm>
           <a:prstGeom prst="rect">
             <a:avLst/>
@@ -5324,7 +5324,7 @@
             <a:pPr algn="ctr"/>
             <a:r>
               <a:rPr lang="pt-BR" sz="1100" dirty="0"/>
-              <a:t>Thread</a:t>
+              <a:t>thread control_servos</a:t>
             </a:r>
           </a:p>
         </p:txBody>
@@ -5343,8 +5343,8 @@
         </p:nvSpPr>
         <p:spPr>
           <a:xfrm>
-            <a:off x="3073082" y="3144789"/>
-            <a:ext cx="1323658" cy="939800"/>
+            <a:off x="4055230" y="3144789"/>
+            <a:ext cx="1828800" cy="914400"/>
           </a:xfrm>
           <a:prstGeom prst="parallelogram">
             <a:avLst/>
@@ -5395,8 +5395,8 @@
         </p:nvSpPr>
         <p:spPr>
           <a:xfrm>
-            <a:off x="3277711" y="3500389"/>
-            <a:ext cx="914400" cy="228600"/>
+            <a:off x="4155814" y="3373389"/>
+            <a:ext cx="1627632" cy="457200"/>
           </a:xfrm>
           <a:prstGeom prst="rect">
             <a:avLst/>
@@ -5415,7 +5415,7 @@
             <a:pPr algn="ctr"/>
             <a:r>
               <a:rPr lang="pt-BR" sz="1100" dirty="0"/>
-              <a:t>Thread</a:t>
+              <a:t>thread process_video</a:t>
             </a:r>
           </a:p>
         </p:txBody>

</xml_diff>